<commit_message>
Added flake8 and travis ci conf.
</commit_message>
<xml_diff>
--- a/Advance Django setup.pptx
+++ b/Advance Django setup.pptx
@@ -11,6 +11,7 @@
     <p:sldId id="259" r:id="rId5"/>
     <p:sldId id="260" r:id="rId6"/>
     <p:sldId id="261" r:id="rId7"/>
+    <p:sldId id="262" r:id="rId8"/>
   </p:sldIdLst>
   <p:sldSz cx="12192000" cy="6858000"/>
   <p:notesSz cx="6858000" cy="9144000"/>
@@ -109,6 +110,11 @@
       </a:defRPr>
     </a:lvl9pPr>
   </p:defaultTextStyle>
+  <p:extLst>
+    <p:ext uri="{EFAFB233-063F-42B5-8137-9DF3F51BA10A}">
+      <p15:sldGuideLst xmlns:p15="http://schemas.microsoft.com/office/powerpoint/2012/main"/>
+    </p:ext>
+  </p:extLst>
 </p:presentation>
 </file>
 
@@ -261,7 +267,7 @@
           <a:p>
             <a:fld id="{2917F6B5-2107-4D80-BD2C-D086FFE2E6AE}" type="datetimeFigureOut">
               <a:rPr lang="en-CA" smtClean="0"/>
-              <a:t>2022-01-06</a:t>
+              <a:t>2022-01-08</a:t>
             </a:fld>
             <a:endParaRPr lang="en-CA"/>
           </a:p>
@@ -461,7 +467,7 @@
           <a:p>
             <a:fld id="{2917F6B5-2107-4D80-BD2C-D086FFE2E6AE}" type="datetimeFigureOut">
               <a:rPr lang="en-CA" smtClean="0"/>
-              <a:t>2022-01-06</a:t>
+              <a:t>2022-01-08</a:t>
             </a:fld>
             <a:endParaRPr lang="en-CA"/>
           </a:p>
@@ -671,7 +677,7 @@
           <a:p>
             <a:fld id="{2917F6B5-2107-4D80-BD2C-D086FFE2E6AE}" type="datetimeFigureOut">
               <a:rPr lang="en-CA" smtClean="0"/>
-              <a:t>2022-01-06</a:t>
+              <a:t>2022-01-08</a:t>
             </a:fld>
             <a:endParaRPr lang="en-CA"/>
           </a:p>
@@ -871,7 +877,7 @@
           <a:p>
             <a:fld id="{2917F6B5-2107-4D80-BD2C-D086FFE2E6AE}" type="datetimeFigureOut">
               <a:rPr lang="en-CA" smtClean="0"/>
-              <a:t>2022-01-06</a:t>
+              <a:t>2022-01-08</a:t>
             </a:fld>
             <a:endParaRPr lang="en-CA"/>
           </a:p>
@@ -1147,7 +1153,7 @@
           <a:p>
             <a:fld id="{2917F6B5-2107-4D80-BD2C-D086FFE2E6AE}" type="datetimeFigureOut">
               <a:rPr lang="en-CA" smtClean="0"/>
-              <a:t>2022-01-06</a:t>
+              <a:t>2022-01-08</a:t>
             </a:fld>
             <a:endParaRPr lang="en-CA"/>
           </a:p>
@@ -1415,7 +1421,7 @@
           <a:p>
             <a:fld id="{2917F6B5-2107-4D80-BD2C-D086FFE2E6AE}" type="datetimeFigureOut">
               <a:rPr lang="en-CA" smtClean="0"/>
-              <a:t>2022-01-06</a:t>
+              <a:t>2022-01-08</a:t>
             </a:fld>
             <a:endParaRPr lang="en-CA"/>
           </a:p>
@@ -1830,7 +1836,7 @@
           <a:p>
             <a:fld id="{2917F6B5-2107-4D80-BD2C-D086FFE2E6AE}" type="datetimeFigureOut">
               <a:rPr lang="en-CA" smtClean="0"/>
-              <a:t>2022-01-06</a:t>
+              <a:t>2022-01-08</a:t>
             </a:fld>
             <a:endParaRPr lang="en-CA"/>
           </a:p>
@@ -1972,7 +1978,7 @@
           <a:p>
             <a:fld id="{2917F6B5-2107-4D80-BD2C-D086FFE2E6AE}" type="datetimeFigureOut">
               <a:rPr lang="en-CA" smtClean="0"/>
-              <a:t>2022-01-06</a:t>
+              <a:t>2022-01-08</a:t>
             </a:fld>
             <a:endParaRPr lang="en-CA"/>
           </a:p>
@@ -2085,7 +2091,7 @@
           <a:p>
             <a:fld id="{2917F6B5-2107-4D80-BD2C-D086FFE2E6AE}" type="datetimeFigureOut">
               <a:rPr lang="en-CA" smtClean="0"/>
-              <a:t>2022-01-06</a:t>
+              <a:t>2022-01-08</a:t>
             </a:fld>
             <a:endParaRPr lang="en-CA"/>
           </a:p>
@@ -2398,7 +2404,7 @@
           <a:p>
             <a:fld id="{2917F6B5-2107-4D80-BD2C-D086FFE2E6AE}" type="datetimeFigureOut">
               <a:rPr lang="en-CA" smtClean="0"/>
-              <a:t>2022-01-06</a:t>
+              <a:t>2022-01-08</a:t>
             </a:fld>
             <a:endParaRPr lang="en-CA"/>
           </a:p>
@@ -2687,7 +2693,7 @@
           <a:p>
             <a:fld id="{2917F6B5-2107-4D80-BD2C-D086FFE2E6AE}" type="datetimeFigureOut">
               <a:rPr lang="en-CA" smtClean="0"/>
-              <a:t>2022-01-06</a:t>
+              <a:t>2022-01-08</a:t>
             </a:fld>
             <a:endParaRPr lang="en-CA"/>
           </a:p>
@@ -2930,7 +2936,7 @@
           <a:p>
             <a:fld id="{2917F6B5-2107-4D80-BD2C-D086FFE2E6AE}" type="datetimeFigureOut">
               <a:rPr lang="en-CA" smtClean="0"/>
-              <a:t>2022-01-06</a:t>
+              <a:t>2022-01-08</a:t>
             </a:fld>
             <a:endParaRPr lang="en-CA"/>
           </a:p>
@@ -3603,7 +3609,7 @@
           <a:p>
             <a:r>
               <a:rPr lang="en-CA" dirty="0"/>
-              <a:t>Travis-CI ( to test code and notify if anything’s broken)</a:t>
+              <a:t>Travis-CI ( to test code on changes and notify if anything’s broken)</a:t>
             </a:r>
           </a:p>
           <a:p>
@@ -4102,6 +4108,192 @@
     <p:extLst>
       <p:ext uri="{BB962C8B-B14F-4D97-AF65-F5344CB8AC3E}">
         <p14:creationId xmlns:p14="http://schemas.microsoft.com/office/powerpoint/2010/main" val="1311061339"/>
+      </p:ext>
+    </p:extLst>
+  </p:cSld>
+  <p:clrMapOvr>
+    <a:masterClrMapping/>
+  </p:clrMapOvr>
+</p:sld>
+</file>
+
+<file path=ppt/slides/slide7.xml><?xml version="1.0" encoding="utf-8"?>
+<p:sld xmlns:a="http://schemas.openxmlformats.org/drawingml/2006/main" xmlns:r="http://schemas.openxmlformats.org/officeDocument/2006/relationships" xmlns:p="http://schemas.openxmlformats.org/presentationml/2006/main">
+  <p:cSld>
+    <p:spTree>
+      <p:nvGrpSpPr>
+        <p:cNvPr id="1" name=""/>
+        <p:cNvGrpSpPr/>
+        <p:nvPr/>
+      </p:nvGrpSpPr>
+      <p:grpSpPr>
+        <a:xfrm>
+          <a:off x="0" y="0"/>
+          <a:ext cx="0" cy="0"/>
+          <a:chOff x="0" y="0"/>
+          <a:chExt cx="0" cy="0"/>
+        </a:xfrm>
+      </p:grpSpPr>
+      <p:sp>
+        <p:nvSpPr>
+          <p:cNvPr id="2" name="Title 1">
+            <a:extLst>
+              <a:ext uri="{FF2B5EF4-FFF2-40B4-BE49-F238E27FC236}">
+                <a16:creationId xmlns:a16="http://schemas.microsoft.com/office/drawing/2014/main" id="{806394B6-E74C-4B18-82F0-B7DA91A266C4}"/>
+              </a:ext>
+            </a:extLst>
+          </p:cNvPr>
+          <p:cNvSpPr>
+            <a:spLocks noGrp="1"/>
+          </p:cNvSpPr>
+          <p:nvPr>
+            <p:ph type="title"/>
+          </p:nvPr>
+        </p:nvSpPr>
+        <p:spPr/>
+        <p:txBody>
+          <a:bodyPr/>
+          <a:lstStyle/>
+          <a:p>
+            <a:r>
+              <a:rPr lang="en-US" dirty="0"/>
+              <a:t>Setting up Travis CI</a:t>
+            </a:r>
+            <a:endParaRPr lang="en-CA" dirty="0"/>
+          </a:p>
+        </p:txBody>
+      </p:sp>
+      <p:sp>
+        <p:nvSpPr>
+          <p:cNvPr id="3" name="Content Placeholder 2">
+            <a:extLst>
+              <a:ext uri="{FF2B5EF4-FFF2-40B4-BE49-F238E27FC236}">
+                <a16:creationId xmlns:a16="http://schemas.microsoft.com/office/drawing/2014/main" id="{083EB1CC-2063-4217-9D39-2934374E4691}"/>
+              </a:ext>
+            </a:extLst>
+          </p:cNvPr>
+          <p:cNvSpPr>
+            <a:spLocks noGrp="1"/>
+          </p:cNvSpPr>
+          <p:nvPr>
+            <p:ph idx="1"/>
+          </p:nvPr>
+        </p:nvSpPr>
+        <p:spPr/>
+        <p:txBody>
+          <a:bodyPr/>
+          <a:lstStyle/>
+          <a:p>
+            <a:r>
+              <a:rPr lang="en-US" dirty="0"/>
+              <a:t>This will give us notifications when our build fails after pushing the project to the </a:t>
+            </a:r>
+            <a:r>
+              <a:rPr lang="en-US" dirty="0" err="1"/>
+              <a:t>github</a:t>
+            </a:r>
+            <a:r>
+              <a:rPr lang="en-US" dirty="0"/>
+              <a:t>.</a:t>
+            </a:r>
+          </a:p>
+          <a:p>
+            <a:pPr lvl="1"/>
+            <a:r>
+              <a:rPr lang="en-US" dirty="0"/>
+              <a:t>Setup the </a:t>
+            </a:r>
+            <a:r>
+              <a:rPr lang="en-US" dirty="0" err="1"/>
+              <a:t>travis</a:t>
+            </a:r>
+            <a:r>
+              <a:rPr lang="en-US" dirty="0"/>
+              <a:t> ci using their website.</a:t>
+            </a:r>
+          </a:p>
+          <a:p>
+            <a:pPr lvl="1"/>
+            <a:r>
+              <a:rPr lang="en-US" dirty="0"/>
+              <a:t>Enable the project repo</a:t>
+            </a:r>
+          </a:p>
+          <a:p>
+            <a:pPr lvl="1"/>
+            <a:r>
+              <a:rPr lang="en-US" dirty="0"/>
+              <a:t>Create .</a:t>
+            </a:r>
+            <a:r>
+              <a:rPr lang="en-US" dirty="0" err="1"/>
+              <a:t>travis.yml</a:t>
+            </a:r>
+            <a:r>
+              <a:rPr lang="en-US" dirty="0"/>
+              <a:t> file to configure </a:t>
+            </a:r>
+            <a:r>
+              <a:rPr lang="en-US" dirty="0" err="1"/>
+              <a:t>travis</a:t>
+            </a:r>
+            <a:r>
+              <a:rPr lang="en-US" dirty="0"/>
+              <a:t> services and scripts</a:t>
+            </a:r>
+          </a:p>
+          <a:p>
+            <a:pPr lvl="2"/>
+            <a:r>
+              <a:rPr lang="en-US" dirty="0"/>
+              <a:t>If you’re adding new modules in </a:t>
+            </a:r>
+            <a:r>
+              <a:rPr lang="en-US" dirty="0" err="1"/>
+              <a:t>travis</a:t>
+            </a:r>
+            <a:r>
+              <a:rPr lang="en-US" dirty="0"/>
+              <a:t>, add those in requirements.txt as well </a:t>
+            </a:r>
+          </a:p>
+          <a:p>
+            <a:pPr lvl="3"/>
+            <a:r>
+              <a:rPr lang="en-US" dirty="0" err="1"/>
+              <a:t>eg</a:t>
+            </a:r>
+            <a:r>
+              <a:rPr lang="en-US" dirty="0"/>
+              <a:t>: flake8 ( tool for python coding standard management)</a:t>
+            </a:r>
+          </a:p>
+          <a:p>
+            <a:pPr lvl="1"/>
+            <a:r>
+              <a:rPr lang="en-US" dirty="0"/>
+              <a:t>Add .flake8 file in the app (the project) to exclude some of the files which are not required to check programming errors using flake8. ( </a:t>
+            </a:r>
+            <a:r>
+              <a:rPr lang="en-US" dirty="0" err="1"/>
+              <a:t>eg</a:t>
+            </a:r>
+            <a:r>
+              <a:rPr lang="en-US" dirty="0"/>
+              <a:t>: </a:t>
+            </a:r>
+            <a:r>
+              <a:rPr lang="en-US"/>
+              <a:t>auto generated ones)</a:t>
+            </a:r>
+            <a:endParaRPr lang="en-CA" dirty="0"/>
+          </a:p>
+        </p:txBody>
+      </p:sp>
+    </p:spTree>
+    <p:extLst>
+      <p:ext uri="{BB962C8B-B14F-4D97-AF65-F5344CB8AC3E}">
+        <p14:creationId xmlns:p14="http://schemas.microsoft.com/office/powerpoint/2010/main" val="4163138200"/>
       </p:ext>
     </p:extLst>
   </p:cSld>

</xml_diff>

<commit_message>
Added custom user model
</commit_message>
<xml_diff>
--- a/Advance Django setup.pptx
+++ b/Advance Django setup.pptx
@@ -12,6 +12,10 @@
     <p:sldId id="260" r:id="rId6"/>
     <p:sldId id="261" r:id="rId7"/>
     <p:sldId id="262" r:id="rId8"/>
+    <p:sldId id="263" r:id="rId9"/>
+    <p:sldId id="264" r:id="rId10"/>
+    <p:sldId id="266" r:id="rId11"/>
+    <p:sldId id="265" r:id="rId12"/>
   </p:sldIdLst>
   <p:sldSz cx="12192000" cy="6858000"/>
   <p:notesSz cx="6858000" cy="9144000"/>
@@ -3419,6 +3423,303 @@
 </p:sld>
 </file>
 
+<file path=ppt/slides/slide10.xml><?xml version="1.0" encoding="utf-8"?>
+<p:sld xmlns:a="http://schemas.openxmlformats.org/drawingml/2006/main" xmlns:r="http://schemas.openxmlformats.org/officeDocument/2006/relationships" xmlns:p="http://schemas.openxmlformats.org/presentationml/2006/main">
+  <p:cSld>
+    <p:spTree>
+      <p:nvGrpSpPr>
+        <p:cNvPr id="1" name=""/>
+        <p:cNvGrpSpPr/>
+        <p:nvPr/>
+      </p:nvGrpSpPr>
+      <p:grpSpPr>
+        <a:xfrm>
+          <a:off x="0" y="0"/>
+          <a:ext cx="0" cy="0"/>
+          <a:chOff x="0" y="0"/>
+          <a:chExt cx="0" cy="0"/>
+        </a:xfrm>
+      </p:grpSpPr>
+      <p:sp>
+        <p:nvSpPr>
+          <p:cNvPr id="2" name="Title 1">
+            <a:extLst>
+              <a:ext uri="{FF2B5EF4-FFF2-40B4-BE49-F238E27FC236}">
+                <a16:creationId xmlns:a16="http://schemas.microsoft.com/office/drawing/2014/main" id="{12CA7F54-AD14-43AF-9418-C3C2C29DAFFE}"/>
+              </a:ext>
+            </a:extLst>
+          </p:cNvPr>
+          <p:cNvSpPr>
+            <a:spLocks noGrp="1"/>
+          </p:cNvSpPr>
+          <p:nvPr>
+            <p:ph type="title"/>
+          </p:nvPr>
+        </p:nvSpPr>
+        <p:spPr/>
+        <p:txBody>
+          <a:bodyPr/>
+          <a:lstStyle/>
+          <a:p>
+            <a:r>
+              <a:rPr lang="en-US" dirty="0"/>
+              <a:t>Core App Custom Model</a:t>
+            </a:r>
+            <a:endParaRPr lang="en-CA" dirty="0"/>
+          </a:p>
+        </p:txBody>
+      </p:sp>
+      <p:sp>
+        <p:nvSpPr>
+          <p:cNvPr id="3" name="Content Placeholder 2">
+            <a:extLst>
+              <a:ext uri="{FF2B5EF4-FFF2-40B4-BE49-F238E27FC236}">
+                <a16:creationId xmlns:a16="http://schemas.microsoft.com/office/drawing/2014/main" id="{C9280B11-434C-47E4-B454-A0B3BC2F3065}"/>
+              </a:ext>
+            </a:extLst>
+          </p:cNvPr>
+          <p:cNvSpPr>
+            <a:spLocks noGrp="1"/>
+          </p:cNvSpPr>
+          <p:nvPr>
+            <p:ph idx="1"/>
+          </p:nvPr>
+        </p:nvSpPr>
+        <p:spPr/>
+        <p:txBody>
+          <a:bodyPr/>
+          <a:lstStyle/>
+          <a:p>
+            <a:r>
+              <a:rPr lang="en-US" dirty="0"/>
+              <a:t>Before creating custom user model (for login n all), create test files to run tests on base user model.</a:t>
+            </a:r>
+          </a:p>
+          <a:p>
+            <a:r>
+              <a:rPr lang="en-US" dirty="0"/>
+              <a:t>Then create custom user model.</a:t>
+            </a:r>
+          </a:p>
+          <a:p>
+            <a:pPr lvl="1"/>
+            <a:r>
+              <a:rPr lang="en-US" dirty="0"/>
+              <a:t>You’ll have to create user manager as well.</a:t>
+            </a:r>
+          </a:p>
+          <a:p>
+            <a:pPr lvl="1"/>
+            <a:r>
+              <a:rPr lang="en-US" dirty="0"/>
+              <a:t>Add user model to settings.</a:t>
+            </a:r>
+          </a:p>
+          <a:p>
+            <a:pPr lvl="1"/>
+            <a:r>
+              <a:rPr lang="en-US" dirty="0"/>
+              <a:t>Then run migration using command: </a:t>
+            </a:r>
+            <a:r>
+              <a:rPr lang="en-US" sz="1800" dirty="0">
+                <a:solidFill>
+                  <a:prstClr val="black"/>
+                </a:solidFill>
+                <a:latin typeface="Lucida Console" panose="020B0609040504020204" pitchFamily="49" charset="0"/>
+              </a:rPr>
+              <a:t> docker-compose run app </a:t>
+            </a:r>
+            <a:r>
+              <a:rPr lang="en-US" sz="1800" dirty="0" err="1">
+                <a:solidFill>
+                  <a:prstClr val="black"/>
+                </a:solidFill>
+                <a:latin typeface="Lucida Console" panose="020B0609040504020204" pitchFamily="49" charset="0"/>
+              </a:rPr>
+              <a:t>sh</a:t>
+            </a:r>
+            <a:r>
+              <a:rPr lang="en-US" sz="1800" dirty="0">
+                <a:solidFill>
+                  <a:prstClr val="black"/>
+                </a:solidFill>
+                <a:latin typeface="Lucida Console" panose="020B0609040504020204" pitchFamily="49" charset="0"/>
+              </a:rPr>
+              <a:t> -c "python manage.py </a:t>
+            </a:r>
+            <a:r>
+              <a:rPr lang="en-US" sz="1800" dirty="0" err="1">
+                <a:solidFill>
+                  <a:prstClr val="black"/>
+                </a:solidFill>
+                <a:latin typeface="Lucida Console" panose="020B0609040504020204" pitchFamily="49" charset="0"/>
+              </a:rPr>
+              <a:t>makemigrations</a:t>
+            </a:r>
+            <a:r>
+              <a:rPr lang="en-US" sz="1800" dirty="0">
+                <a:solidFill>
+                  <a:prstClr val="black"/>
+                </a:solidFill>
+                <a:latin typeface="Lucida Console" panose="020B0609040504020204" pitchFamily="49" charset="0"/>
+              </a:rPr>
+              <a:t> core"</a:t>
+            </a:r>
+          </a:p>
+          <a:p>
+            <a:pPr lvl="1"/>
+            <a:r>
+              <a:rPr lang="en-CA" dirty="0"/>
+              <a:t>Then run the test command to check everything’s working: </a:t>
+            </a:r>
+            <a:r>
+              <a:rPr lang="en-US" sz="1800" dirty="0">
+                <a:solidFill>
+                  <a:prstClr val="black"/>
+                </a:solidFill>
+                <a:latin typeface="Lucida Console" panose="020B0609040504020204" pitchFamily="49" charset="0"/>
+              </a:rPr>
+              <a:t> docker-compose run app </a:t>
+            </a:r>
+            <a:r>
+              <a:rPr lang="en-US" sz="1800" dirty="0" err="1">
+                <a:solidFill>
+                  <a:prstClr val="black"/>
+                </a:solidFill>
+                <a:latin typeface="Lucida Console" panose="020B0609040504020204" pitchFamily="49" charset="0"/>
+              </a:rPr>
+              <a:t>sh</a:t>
+            </a:r>
+            <a:r>
+              <a:rPr lang="en-US" sz="1800" dirty="0">
+                <a:solidFill>
+                  <a:prstClr val="black"/>
+                </a:solidFill>
+                <a:latin typeface="Lucida Console" panose="020B0609040504020204" pitchFamily="49" charset="0"/>
+              </a:rPr>
+              <a:t> -c "python manage.py test &amp;&amp; flake8"</a:t>
+            </a:r>
+          </a:p>
+          <a:p>
+            <a:pPr lvl="1"/>
+            <a:endParaRPr lang="en-CA" dirty="0"/>
+          </a:p>
+          <a:p>
+            <a:pPr lvl="1"/>
+            <a:endParaRPr lang="en-CA" dirty="0"/>
+          </a:p>
+        </p:txBody>
+      </p:sp>
+    </p:spTree>
+    <p:extLst>
+      <p:ext uri="{BB962C8B-B14F-4D97-AF65-F5344CB8AC3E}">
+        <p14:creationId xmlns:p14="http://schemas.microsoft.com/office/powerpoint/2010/main" val="4085826537"/>
+      </p:ext>
+    </p:extLst>
+  </p:cSld>
+  <p:clrMapOvr>
+    <a:masterClrMapping/>
+  </p:clrMapOvr>
+</p:sld>
+</file>
+
+<file path=ppt/slides/slide11.xml><?xml version="1.0" encoding="utf-8"?>
+<p:sld xmlns:a="http://schemas.openxmlformats.org/drawingml/2006/main" xmlns:r="http://schemas.openxmlformats.org/officeDocument/2006/relationships" xmlns:p="http://schemas.openxmlformats.org/presentationml/2006/main">
+  <p:cSld>
+    <p:spTree>
+      <p:nvGrpSpPr>
+        <p:cNvPr id="1" name=""/>
+        <p:cNvGrpSpPr/>
+        <p:nvPr/>
+      </p:nvGrpSpPr>
+      <p:grpSpPr>
+        <a:xfrm>
+          <a:off x="0" y="0"/>
+          <a:ext cx="0" cy="0"/>
+          <a:chOff x="0" y="0"/>
+          <a:chExt cx="0" cy="0"/>
+        </a:xfrm>
+      </p:grpSpPr>
+      <p:sp>
+        <p:nvSpPr>
+          <p:cNvPr id="2" name="Title 1">
+            <a:extLst>
+              <a:ext uri="{FF2B5EF4-FFF2-40B4-BE49-F238E27FC236}">
+                <a16:creationId xmlns:a16="http://schemas.microsoft.com/office/drawing/2014/main" id="{ABCC5C36-83CB-4981-9379-43EC8DC835DF}"/>
+              </a:ext>
+            </a:extLst>
+          </p:cNvPr>
+          <p:cNvSpPr>
+            <a:spLocks noGrp="1"/>
+          </p:cNvSpPr>
+          <p:nvPr>
+            <p:ph type="title"/>
+          </p:nvPr>
+        </p:nvSpPr>
+        <p:spPr/>
+        <p:txBody>
+          <a:bodyPr/>
+          <a:lstStyle/>
+          <a:p>
+            <a:r>
+              <a:rPr lang="en-US" dirty="0"/>
+              <a:t>Notes</a:t>
+            </a:r>
+            <a:endParaRPr lang="en-CA" dirty="0"/>
+          </a:p>
+        </p:txBody>
+      </p:sp>
+      <p:sp>
+        <p:nvSpPr>
+          <p:cNvPr id="3" name="Content Placeholder 2">
+            <a:extLst>
+              <a:ext uri="{FF2B5EF4-FFF2-40B4-BE49-F238E27FC236}">
+                <a16:creationId xmlns:a16="http://schemas.microsoft.com/office/drawing/2014/main" id="{A1D327CE-7AE7-459F-A902-86104F4373FA}"/>
+              </a:ext>
+            </a:extLst>
+          </p:cNvPr>
+          <p:cNvSpPr>
+            <a:spLocks noGrp="1"/>
+          </p:cNvSpPr>
+          <p:nvPr>
+            <p:ph idx="1"/>
+          </p:nvPr>
+        </p:nvSpPr>
+        <p:spPr/>
+        <p:txBody>
+          <a:bodyPr/>
+          <a:lstStyle/>
+          <a:p>
+            <a:r>
+              <a:rPr lang="en-US" dirty="0"/>
+              <a:t>Always run docker-compose build command when adding new module to requirement file.</a:t>
+            </a:r>
+          </a:p>
+          <a:p>
+            <a:r>
+              <a:rPr lang="en-US" dirty="0"/>
+              <a:t>Always write test first before developing models.</a:t>
+            </a:r>
+          </a:p>
+          <a:p>
+            <a:endParaRPr lang="en-CA" dirty="0"/>
+          </a:p>
+        </p:txBody>
+      </p:sp>
+    </p:spTree>
+    <p:extLst>
+      <p:ext uri="{BB962C8B-B14F-4D97-AF65-F5344CB8AC3E}">
+        <p14:creationId xmlns:p14="http://schemas.microsoft.com/office/powerpoint/2010/main" val="1312274422"/>
+      </p:ext>
+    </p:extLst>
+  </p:cSld>
+  <p:clrMapOvr>
+    <a:masterClrMapping/>
+  </p:clrMapOvr>
+</p:sld>
+</file>
+
 <file path=ppt/slides/slide2.xml><?xml version="1.0" encoding="utf-8"?>
 <p:sld xmlns:a="http://schemas.openxmlformats.org/drawingml/2006/main" xmlns:r="http://schemas.openxmlformats.org/officeDocument/2006/relationships" xmlns:p="http://schemas.openxmlformats.org/presentationml/2006/main">
   <p:cSld>
@@ -4269,6 +4570,13 @@
             </a:r>
           </a:p>
           <a:p>
+            <a:pPr lvl="3"/>
+            <a:r>
+              <a:rPr lang="en-US" dirty="0"/>
+              <a:t>If you’re adding anything to requirements run “docker-compose build” command</a:t>
+            </a:r>
+          </a:p>
+          <a:p>
             <a:pPr lvl="1"/>
             <a:r>
               <a:rPr lang="en-US" dirty="0"/>
@@ -4280,11 +4588,7 @@
             </a:r>
             <a:r>
               <a:rPr lang="en-US" dirty="0"/>
-              <a:t>: </a:t>
-            </a:r>
-            <a:r>
-              <a:rPr lang="en-US"/>
-              <a:t>auto generated ones)</a:t>
+              <a:t>: auto generated ones)</a:t>
             </a:r>
             <a:endParaRPr lang="en-CA" dirty="0"/>
           </a:p>
@@ -4294,6 +4598,350 @@
     <p:extLst>
       <p:ext uri="{BB962C8B-B14F-4D97-AF65-F5344CB8AC3E}">
         <p14:creationId xmlns:p14="http://schemas.microsoft.com/office/powerpoint/2010/main" val="4163138200"/>
+      </p:ext>
+    </p:extLst>
+  </p:cSld>
+  <p:clrMapOvr>
+    <a:masterClrMapping/>
+  </p:clrMapOvr>
+</p:sld>
+</file>
+
+<file path=ppt/slides/slide8.xml><?xml version="1.0" encoding="utf-8"?>
+<p:sld xmlns:a="http://schemas.openxmlformats.org/drawingml/2006/main" xmlns:r="http://schemas.openxmlformats.org/officeDocument/2006/relationships" xmlns:p="http://schemas.openxmlformats.org/presentationml/2006/main">
+  <p:cSld>
+    <p:spTree>
+      <p:nvGrpSpPr>
+        <p:cNvPr id="1" name=""/>
+        <p:cNvGrpSpPr/>
+        <p:nvPr/>
+      </p:nvGrpSpPr>
+      <p:grpSpPr>
+        <a:xfrm>
+          <a:off x="0" y="0"/>
+          <a:ext cx="0" cy="0"/>
+          <a:chOff x="0" y="0"/>
+          <a:chExt cx="0" cy="0"/>
+        </a:xfrm>
+      </p:grpSpPr>
+      <p:sp>
+        <p:nvSpPr>
+          <p:cNvPr id="2" name="Title 1">
+            <a:extLst>
+              <a:ext uri="{FF2B5EF4-FFF2-40B4-BE49-F238E27FC236}">
+                <a16:creationId xmlns:a16="http://schemas.microsoft.com/office/drawing/2014/main" id="{552B317A-477E-4D9A-B554-9AA49BB84E6F}"/>
+              </a:ext>
+            </a:extLst>
+          </p:cNvPr>
+          <p:cNvSpPr>
+            <a:spLocks noGrp="1"/>
+          </p:cNvSpPr>
+          <p:nvPr>
+            <p:ph type="title"/>
+          </p:nvPr>
+        </p:nvSpPr>
+        <p:spPr/>
+        <p:txBody>
+          <a:bodyPr/>
+          <a:lstStyle/>
+          <a:p>
+            <a:r>
+              <a:rPr lang="en-US" dirty="0"/>
+              <a:t>Setup Test file</a:t>
+            </a:r>
+            <a:endParaRPr lang="en-CA" dirty="0"/>
+          </a:p>
+        </p:txBody>
+      </p:sp>
+      <p:sp>
+        <p:nvSpPr>
+          <p:cNvPr id="3" name="Content Placeholder 2">
+            <a:extLst>
+              <a:ext uri="{FF2B5EF4-FFF2-40B4-BE49-F238E27FC236}">
+                <a16:creationId xmlns:a16="http://schemas.microsoft.com/office/drawing/2014/main" id="{1547D115-B778-4038-9CD7-C8517A8B5434}"/>
+              </a:ext>
+            </a:extLst>
+          </p:cNvPr>
+          <p:cNvSpPr>
+            <a:spLocks noGrp="1"/>
+          </p:cNvSpPr>
+          <p:nvPr>
+            <p:ph idx="1"/>
+          </p:nvPr>
+        </p:nvSpPr>
+        <p:spPr/>
+        <p:txBody>
+          <a:bodyPr/>
+          <a:lstStyle/>
+          <a:p>
+            <a:r>
+              <a:rPr lang="en-US" dirty="0"/>
+              <a:t>Create function file when you’re going to add main functions</a:t>
+            </a:r>
+          </a:p>
+          <a:p>
+            <a:r>
+              <a:rPr lang="en-US" dirty="0"/>
+              <a:t>Create Test.py file and add class which will use </a:t>
+            </a:r>
+            <a:r>
+              <a:rPr lang="en-US" dirty="0" err="1"/>
+              <a:t>TestCase</a:t>
+            </a:r>
+            <a:r>
+              <a:rPr lang="en-US" dirty="0"/>
+              <a:t> and assert functions to test the functions.</a:t>
+            </a:r>
+          </a:p>
+          <a:p>
+            <a:r>
+              <a:rPr lang="en-US" dirty="0"/>
+              <a:t>Use this command to run the test:</a:t>
+            </a:r>
+          </a:p>
+          <a:p>
+            <a:pPr lvl="1"/>
+            <a:r>
+              <a:rPr lang="en-US" sz="1800" dirty="0">
+                <a:solidFill>
+                  <a:prstClr val="black"/>
+                </a:solidFill>
+                <a:latin typeface="Lucida Console" panose="020B0609040504020204" pitchFamily="49" charset="0"/>
+              </a:rPr>
+              <a:t>$ docker-compose run app </a:t>
+            </a:r>
+            <a:r>
+              <a:rPr lang="en-US" sz="1800" dirty="0" err="1">
+                <a:solidFill>
+                  <a:prstClr val="black"/>
+                </a:solidFill>
+                <a:latin typeface="Lucida Console" panose="020B0609040504020204" pitchFamily="49" charset="0"/>
+              </a:rPr>
+              <a:t>sh</a:t>
+            </a:r>
+            <a:r>
+              <a:rPr lang="en-US" sz="1800" dirty="0">
+                <a:solidFill>
+                  <a:prstClr val="black"/>
+                </a:solidFill>
+                <a:latin typeface="Lucida Console" panose="020B0609040504020204" pitchFamily="49" charset="0"/>
+              </a:rPr>
+              <a:t> -c "python manage.py test &amp;&amp; flake8"</a:t>
+            </a:r>
+          </a:p>
+          <a:p>
+            <a:r>
+              <a:rPr lang="en-US" dirty="0"/>
+              <a:t>Remember we’ll be using docker compose through out the project to run things separately than the main system.</a:t>
+            </a:r>
+          </a:p>
+          <a:p>
+            <a:endParaRPr lang="en-US" dirty="0"/>
+          </a:p>
+        </p:txBody>
+      </p:sp>
+    </p:spTree>
+    <p:extLst>
+      <p:ext uri="{BB962C8B-B14F-4D97-AF65-F5344CB8AC3E}">
+        <p14:creationId xmlns:p14="http://schemas.microsoft.com/office/powerpoint/2010/main" val="3819569915"/>
+      </p:ext>
+    </p:extLst>
+  </p:cSld>
+  <p:clrMapOvr>
+    <a:masterClrMapping/>
+  </p:clrMapOvr>
+</p:sld>
+</file>
+
+<file path=ppt/slides/slide9.xml><?xml version="1.0" encoding="utf-8"?>
+<p:sld xmlns:a="http://schemas.openxmlformats.org/drawingml/2006/main" xmlns:r="http://schemas.openxmlformats.org/officeDocument/2006/relationships" xmlns:p="http://schemas.openxmlformats.org/presentationml/2006/main">
+  <p:cSld>
+    <p:spTree>
+      <p:nvGrpSpPr>
+        <p:cNvPr id="1" name=""/>
+        <p:cNvGrpSpPr/>
+        <p:nvPr/>
+      </p:nvGrpSpPr>
+      <p:grpSpPr>
+        <a:xfrm>
+          <a:off x="0" y="0"/>
+          <a:ext cx="0" cy="0"/>
+          <a:chOff x="0" y="0"/>
+          <a:chExt cx="0" cy="0"/>
+        </a:xfrm>
+      </p:grpSpPr>
+      <p:sp>
+        <p:nvSpPr>
+          <p:cNvPr id="2" name="Title 1">
+            <a:extLst>
+              <a:ext uri="{FF2B5EF4-FFF2-40B4-BE49-F238E27FC236}">
+                <a16:creationId xmlns:a16="http://schemas.microsoft.com/office/drawing/2014/main" id="{0916F76D-4797-45A3-BFF4-48E187752BB9}"/>
+              </a:ext>
+            </a:extLst>
+          </p:cNvPr>
+          <p:cNvSpPr>
+            <a:spLocks noGrp="1"/>
+          </p:cNvSpPr>
+          <p:nvPr>
+            <p:ph type="title"/>
+          </p:nvPr>
+        </p:nvSpPr>
+        <p:spPr/>
+        <p:txBody>
+          <a:bodyPr/>
+          <a:lstStyle/>
+          <a:p>
+            <a:r>
+              <a:rPr lang="en-US" dirty="0"/>
+              <a:t>Create Core App</a:t>
+            </a:r>
+            <a:endParaRPr lang="en-CA" dirty="0"/>
+          </a:p>
+        </p:txBody>
+      </p:sp>
+      <p:sp>
+        <p:nvSpPr>
+          <p:cNvPr id="3" name="Content Placeholder 2">
+            <a:extLst>
+              <a:ext uri="{FF2B5EF4-FFF2-40B4-BE49-F238E27FC236}">
+                <a16:creationId xmlns:a16="http://schemas.microsoft.com/office/drawing/2014/main" id="{7ECFEA08-5029-4E6E-8723-6BE091963256}"/>
+              </a:ext>
+            </a:extLst>
+          </p:cNvPr>
+          <p:cNvSpPr>
+            <a:spLocks noGrp="1"/>
+          </p:cNvSpPr>
+          <p:nvPr>
+            <p:ph idx="1"/>
+          </p:nvPr>
+        </p:nvSpPr>
+        <p:spPr/>
+        <p:txBody>
+          <a:bodyPr/>
+          <a:lstStyle/>
+          <a:p>
+            <a:r>
+              <a:rPr lang="en-US" dirty="0"/>
+              <a:t>The reason to setup core application module is to have all common configurations in one app.</a:t>
+            </a:r>
+          </a:p>
+          <a:p>
+            <a:pPr lvl="1"/>
+            <a:r>
+              <a:rPr lang="en-US" dirty="0"/>
+              <a:t>May include:</a:t>
+            </a:r>
+          </a:p>
+          <a:p>
+            <a:pPr lvl="2"/>
+            <a:r>
+              <a:rPr lang="en-US" dirty="0"/>
+              <a:t>Migrations</a:t>
+            </a:r>
+          </a:p>
+          <a:p>
+            <a:pPr lvl="2"/>
+            <a:r>
+              <a:rPr lang="en-US" dirty="0"/>
+              <a:t>Databases</a:t>
+            </a:r>
+          </a:p>
+          <a:p>
+            <a:r>
+              <a:rPr lang="en-US" dirty="0"/>
+              <a:t>Setup:</a:t>
+            </a:r>
+          </a:p>
+          <a:p>
+            <a:pPr lvl="1"/>
+            <a:r>
+              <a:rPr lang="en-US" sz="1800" dirty="0">
+                <a:solidFill>
+                  <a:prstClr val="black"/>
+                </a:solidFill>
+                <a:latin typeface="Lucida Console" panose="020B0609040504020204" pitchFamily="49" charset="0"/>
+              </a:rPr>
+              <a:t>docker-compose run app </a:t>
+            </a:r>
+            <a:r>
+              <a:rPr lang="en-US" sz="1800" dirty="0" err="1">
+                <a:solidFill>
+                  <a:prstClr val="black"/>
+                </a:solidFill>
+                <a:latin typeface="Lucida Console" panose="020B0609040504020204" pitchFamily="49" charset="0"/>
+              </a:rPr>
+              <a:t>sh</a:t>
+            </a:r>
+            <a:r>
+              <a:rPr lang="en-US" sz="1800" dirty="0">
+                <a:solidFill>
+                  <a:prstClr val="black"/>
+                </a:solidFill>
+                <a:latin typeface="Lucida Console" panose="020B0609040504020204" pitchFamily="49" charset="0"/>
+              </a:rPr>
+              <a:t> -c "python manage.py </a:t>
+            </a:r>
+            <a:r>
+              <a:rPr lang="en-US" sz="1800" dirty="0" err="1">
+                <a:solidFill>
+                  <a:prstClr val="black"/>
+                </a:solidFill>
+                <a:latin typeface="Lucida Console" panose="020B0609040504020204" pitchFamily="49" charset="0"/>
+              </a:rPr>
+              <a:t>startapp</a:t>
+            </a:r>
+            <a:r>
+              <a:rPr lang="en-US" sz="1800" dirty="0">
+                <a:solidFill>
+                  <a:prstClr val="black"/>
+                </a:solidFill>
+                <a:latin typeface="Lucida Console" panose="020B0609040504020204" pitchFamily="49" charset="0"/>
+              </a:rPr>
+              <a:t> core"</a:t>
+            </a:r>
+          </a:p>
+          <a:p>
+            <a:pPr lvl="1"/>
+            <a:r>
+              <a:rPr lang="en-US" dirty="0"/>
+              <a:t>Remove tests.py and views.py</a:t>
+            </a:r>
+          </a:p>
+          <a:p>
+            <a:pPr lvl="2"/>
+            <a:r>
+              <a:rPr lang="en-US" dirty="0"/>
+              <a:t>We’ll have separate folder for tests functions and core project does not serve any views.</a:t>
+            </a:r>
+          </a:p>
+          <a:p>
+            <a:pPr lvl="1"/>
+            <a:r>
+              <a:rPr lang="en-US" dirty="0"/>
+              <a:t>Create Tests folder inside core folder and add __init__.py file in that folder.</a:t>
+            </a:r>
+          </a:p>
+          <a:p>
+            <a:pPr lvl="1"/>
+            <a:r>
+              <a:rPr lang="en-US" dirty="0"/>
+              <a:t>Add core app to </a:t>
+            </a:r>
+            <a:r>
+              <a:rPr lang="en-US" dirty="0" err="1"/>
+              <a:t>installed_apps</a:t>
+            </a:r>
+            <a:r>
+              <a:rPr lang="en-US" dirty="0"/>
+              <a:t> list in settings.py</a:t>
+            </a:r>
+          </a:p>
+        </p:txBody>
+      </p:sp>
+    </p:spTree>
+    <p:extLst>
+      <p:ext uri="{BB962C8B-B14F-4D97-AF65-F5344CB8AC3E}">
+        <p14:creationId xmlns:p14="http://schemas.microsoft.com/office/powerpoint/2010/main" val="868843183"/>
       </p:ext>
     </p:extLst>
   </p:cSld>

</xml_diff>

<commit_message>
Updated admin support custom user model
</commit_message>
<xml_diff>
--- a/Advance Django setup.pptx
+++ b/Advance Django setup.pptx
@@ -15,7 +15,8 @@
     <p:sldId id="263" r:id="rId9"/>
     <p:sldId id="264" r:id="rId10"/>
     <p:sldId id="266" r:id="rId11"/>
-    <p:sldId id="265" r:id="rId12"/>
+    <p:sldId id="267" r:id="rId12"/>
+    <p:sldId id="265" r:id="rId13"/>
   </p:sldIdLst>
   <p:sldSz cx="12192000" cy="6858000"/>
   <p:notesSz cx="6858000" cy="9144000"/>
@@ -271,7 +272,7 @@
           <a:p>
             <a:fld id="{2917F6B5-2107-4D80-BD2C-D086FFE2E6AE}" type="datetimeFigureOut">
               <a:rPr lang="en-CA" smtClean="0"/>
-              <a:t>2022-01-08</a:t>
+              <a:t>2022-01-09</a:t>
             </a:fld>
             <a:endParaRPr lang="en-CA"/>
           </a:p>
@@ -471,7 +472,7 @@
           <a:p>
             <a:fld id="{2917F6B5-2107-4D80-BD2C-D086FFE2E6AE}" type="datetimeFigureOut">
               <a:rPr lang="en-CA" smtClean="0"/>
-              <a:t>2022-01-08</a:t>
+              <a:t>2022-01-09</a:t>
             </a:fld>
             <a:endParaRPr lang="en-CA"/>
           </a:p>
@@ -681,7 +682,7 @@
           <a:p>
             <a:fld id="{2917F6B5-2107-4D80-BD2C-D086FFE2E6AE}" type="datetimeFigureOut">
               <a:rPr lang="en-CA" smtClean="0"/>
-              <a:t>2022-01-08</a:t>
+              <a:t>2022-01-09</a:t>
             </a:fld>
             <a:endParaRPr lang="en-CA"/>
           </a:p>
@@ -881,7 +882,7 @@
           <a:p>
             <a:fld id="{2917F6B5-2107-4D80-BD2C-D086FFE2E6AE}" type="datetimeFigureOut">
               <a:rPr lang="en-CA" smtClean="0"/>
-              <a:t>2022-01-08</a:t>
+              <a:t>2022-01-09</a:t>
             </a:fld>
             <a:endParaRPr lang="en-CA"/>
           </a:p>
@@ -1157,7 +1158,7 @@
           <a:p>
             <a:fld id="{2917F6B5-2107-4D80-BD2C-D086FFE2E6AE}" type="datetimeFigureOut">
               <a:rPr lang="en-CA" smtClean="0"/>
-              <a:t>2022-01-08</a:t>
+              <a:t>2022-01-09</a:t>
             </a:fld>
             <a:endParaRPr lang="en-CA"/>
           </a:p>
@@ -1425,7 +1426,7 @@
           <a:p>
             <a:fld id="{2917F6B5-2107-4D80-BD2C-D086FFE2E6AE}" type="datetimeFigureOut">
               <a:rPr lang="en-CA" smtClean="0"/>
-              <a:t>2022-01-08</a:t>
+              <a:t>2022-01-09</a:t>
             </a:fld>
             <a:endParaRPr lang="en-CA"/>
           </a:p>
@@ -1840,7 +1841,7 @@
           <a:p>
             <a:fld id="{2917F6B5-2107-4D80-BD2C-D086FFE2E6AE}" type="datetimeFigureOut">
               <a:rPr lang="en-CA" smtClean="0"/>
-              <a:t>2022-01-08</a:t>
+              <a:t>2022-01-09</a:t>
             </a:fld>
             <a:endParaRPr lang="en-CA"/>
           </a:p>
@@ -1982,7 +1983,7 @@
           <a:p>
             <a:fld id="{2917F6B5-2107-4D80-BD2C-D086FFE2E6AE}" type="datetimeFigureOut">
               <a:rPr lang="en-CA" smtClean="0"/>
-              <a:t>2022-01-08</a:t>
+              <a:t>2022-01-09</a:t>
             </a:fld>
             <a:endParaRPr lang="en-CA"/>
           </a:p>
@@ -2095,7 +2096,7 @@
           <a:p>
             <a:fld id="{2917F6B5-2107-4D80-BD2C-D086FFE2E6AE}" type="datetimeFigureOut">
               <a:rPr lang="en-CA" smtClean="0"/>
-              <a:t>2022-01-08</a:t>
+              <a:t>2022-01-09</a:t>
             </a:fld>
             <a:endParaRPr lang="en-CA"/>
           </a:p>
@@ -2408,7 +2409,7 @@
           <a:p>
             <a:fld id="{2917F6B5-2107-4D80-BD2C-D086FFE2E6AE}" type="datetimeFigureOut">
               <a:rPr lang="en-CA" smtClean="0"/>
-              <a:t>2022-01-08</a:t>
+              <a:t>2022-01-09</a:t>
             </a:fld>
             <a:endParaRPr lang="en-CA"/>
           </a:p>
@@ -2697,7 +2698,7 @@
           <a:p>
             <a:fld id="{2917F6B5-2107-4D80-BD2C-D086FFE2E6AE}" type="datetimeFigureOut">
               <a:rPr lang="en-CA" smtClean="0"/>
-              <a:t>2022-01-08</a:t>
+              <a:t>2022-01-09</a:t>
             </a:fld>
             <a:endParaRPr lang="en-CA"/>
           </a:p>
@@ -2940,7 +2941,7 @@
           <a:p>
             <a:fld id="{2917F6B5-2107-4D80-BD2C-D086FFE2E6AE}" type="datetimeFigureOut">
               <a:rPr lang="en-CA" smtClean="0"/>
-              <a:t>2022-01-08</a:t>
+              <a:t>2022-01-09</a:t>
             </a:fld>
             <a:endParaRPr lang="en-CA"/>
           </a:p>
@@ -3646,6 +3647,176 @@
           <p:cNvPr id="2" name="Title 1">
             <a:extLst>
               <a:ext uri="{FF2B5EF4-FFF2-40B4-BE49-F238E27FC236}">
+                <a16:creationId xmlns:a16="http://schemas.microsoft.com/office/drawing/2014/main" id="{44B4BDCD-C8DD-42B1-96F9-996FC1956FFD}"/>
+              </a:ext>
+            </a:extLst>
+          </p:cNvPr>
+          <p:cNvSpPr>
+            <a:spLocks noGrp="1"/>
+          </p:cNvSpPr>
+          <p:nvPr>
+            <p:ph type="title"/>
+          </p:nvPr>
+        </p:nvSpPr>
+        <p:spPr/>
+        <p:txBody>
+          <a:bodyPr/>
+          <a:lstStyle/>
+          <a:p>
+            <a:r>
+              <a:rPr lang="en-US" dirty="0"/>
+              <a:t>Admin Setup</a:t>
+            </a:r>
+            <a:endParaRPr lang="en-CA" dirty="0"/>
+          </a:p>
+        </p:txBody>
+      </p:sp>
+      <p:sp>
+        <p:nvSpPr>
+          <p:cNvPr id="3" name="Content Placeholder 2">
+            <a:extLst>
+              <a:ext uri="{FF2B5EF4-FFF2-40B4-BE49-F238E27FC236}">
+                <a16:creationId xmlns:a16="http://schemas.microsoft.com/office/drawing/2014/main" id="{8ACE3EEC-F82D-40B2-A838-0FDFCA63EC7D}"/>
+              </a:ext>
+            </a:extLst>
+          </p:cNvPr>
+          <p:cNvSpPr>
+            <a:spLocks noGrp="1"/>
+          </p:cNvSpPr>
+          <p:nvPr>
+            <p:ph idx="1"/>
+          </p:nvPr>
+        </p:nvSpPr>
+        <p:spPr/>
+        <p:txBody>
+          <a:bodyPr/>
+          <a:lstStyle/>
+          <a:p>
+            <a:r>
+              <a:rPr lang="en-US" dirty="0"/>
+              <a:t>To call tests on admin, create test_admin.py in tests folder.</a:t>
+            </a:r>
+          </a:p>
+          <a:p>
+            <a:pPr lvl="1"/>
+            <a:r>
+              <a:rPr lang="en-CA" dirty="0"/>
+              <a:t>Setup function will force login the admin and create new user.</a:t>
+            </a:r>
+          </a:p>
+          <a:p>
+            <a:pPr lvl="1"/>
+            <a:r>
+              <a:rPr lang="en-CA" dirty="0"/>
+              <a:t>Test user listed will check if users will be listed on the </a:t>
+            </a:r>
+            <a:r>
+              <a:rPr lang="en-CA" dirty="0" err="1"/>
+              <a:t>url</a:t>
+            </a:r>
+            <a:r>
+              <a:rPr lang="en-CA" dirty="0"/>
+              <a:t> or not.</a:t>
+            </a:r>
+          </a:p>
+          <a:p>
+            <a:pPr lvl="2"/>
+            <a:r>
+              <a:rPr lang="en-CA" dirty="0"/>
+              <a:t>to make the test successful, new model (</a:t>
+            </a:r>
+            <a:r>
+              <a:rPr lang="en-CA" dirty="0" err="1"/>
+              <a:t>UserAdmin</a:t>
+            </a:r>
+            <a:r>
+              <a:rPr lang="en-CA" dirty="0"/>
+              <a:t>) needs to be created and registered.</a:t>
+            </a:r>
+          </a:p>
+          <a:p>
+            <a:pPr lvl="2"/>
+            <a:r>
+              <a:rPr lang="en-CA" dirty="0" err="1"/>
+              <a:t>UserAdmin</a:t>
+            </a:r>
+            <a:r>
+              <a:rPr lang="en-CA" dirty="0"/>
+              <a:t> will allow us to make changes in other </a:t>
+            </a:r>
+            <a:r>
+              <a:rPr lang="en-CA" dirty="0" err="1"/>
+              <a:t>users’s</a:t>
+            </a:r>
+            <a:r>
+              <a:rPr lang="en-CA" dirty="0"/>
+              <a:t> data using admin panel. </a:t>
+            </a:r>
+            <a:r>
+              <a:rPr lang="en-CA" dirty="0" err="1"/>
+              <a:t>ie</a:t>
+            </a:r>
+            <a:r>
+              <a:rPr lang="en-CA" dirty="0"/>
+              <a:t> passwords. Admin can change user’s information from the admin panel.</a:t>
+            </a:r>
+          </a:p>
+          <a:p>
+            <a:pPr lvl="2"/>
+            <a:r>
+              <a:rPr lang="en-CA" dirty="0"/>
+              <a:t>Admin features: list users, edit users, add user, (delete may not require </a:t>
+            </a:r>
+            <a:r>
+              <a:rPr lang="en-CA"/>
+              <a:t>any changes)</a:t>
+            </a:r>
+            <a:endParaRPr lang="en-CA" dirty="0"/>
+          </a:p>
+          <a:p>
+            <a:pPr lvl="2"/>
+            <a:r>
+              <a:rPr lang="en-CA" dirty="0"/>
+              <a:t>Note: remember that these features are already implemented by Django… if we had not made any changes into their code, we would not need to make test calls for it. ( by changes I means overriding default user methods create/update to support email rather username.)</a:t>
+            </a:r>
+          </a:p>
+        </p:txBody>
+      </p:sp>
+    </p:spTree>
+    <p:extLst>
+      <p:ext uri="{BB962C8B-B14F-4D97-AF65-F5344CB8AC3E}">
+        <p14:creationId xmlns:p14="http://schemas.microsoft.com/office/powerpoint/2010/main" val="1435256532"/>
+      </p:ext>
+    </p:extLst>
+  </p:cSld>
+  <p:clrMapOvr>
+    <a:masterClrMapping/>
+  </p:clrMapOvr>
+</p:sld>
+</file>
+
+<file path=ppt/slides/slide12.xml><?xml version="1.0" encoding="utf-8"?>
+<p:sld xmlns:a="http://schemas.openxmlformats.org/drawingml/2006/main" xmlns:r="http://schemas.openxmlformats.org/officeDocument/2006/relationships" xmlns:p="http://schemas.openxmlformats.org/presentationml/2006/main">
+  <p:cSld>
+    <p:spTree>
+      <p:nvGrpSpPr>
+        <p:cNvPr id="1" name=""/>
+        <p:cNvGrpSpPr/>
+        <p:nvPr/>
+      </p:nvGrpSpPr>
+      <p:grpSpPr>
+        <a:xfrm>
+          <a:off x="0" y="0"/>
+          <a:ext cx="0" cy="0"/>
+          <a:chOff x="0" y="0"/>
+          <a:chExt cx="0" cy="0"/>
+        </a:xfrm>
+      </p:grpSpPr>
+      <p:sp>
+        <p:nvSpPr>
+          <p:cNvPr id="2" name="Title 1">
+            <a:extLst>
+              <a:ext uri="{FF2B5EF4-FFF2-40B4-BE49-F238E27FC236}">
                 <a16:creationId xmlns:a16="http://schemas.microsoft.com/office/drawing/2014/main" id="{ABCC5C36-83CB-4981-9379-43EC8DC835DF}"/>
               </a:ext>
             </a:extLst>

</xml_diff>

<commit_message>
added creating and authenticating the user
</commit_message>
<xml_diff>
--- a/Advance Django setup.pptx
+++ b/Advance Django setup.pptx
@@ -20,7 +20,9 @@
     <p:sldId id="269" r:id="rId14"/>
     <p:sldId id="270" r:id="rId15"/>
     <p:sldId id="271" r:id="rId16"/>
-    <p:sldId id="265" r:id="rId17"/>
+    <p:sldId id="272" r:id="rId17"/>
+    <p:sldId id="273" r:id="rId18"/>
+    <p:sldId id="265" r:id="rId19"/>
   </p:sldIdLst>
   <p:sldSz cx="12192000" cy="6858000"/>
   <p:notesSz cx="6858000" cy="9144000"/>
@@ -4372,13 +4374,8 @@
           <a:p>
             <a:r>
               <a:rPr lang="en-CA" dirty="0"/>
-              <a:t>Run docker-compose up to </a:t>
-            </a:r>
-            <a:r>
-              <a:rPr lang="en-CA"/>
-              <a:t>make migrations.</a:t>
-            </a:r>
-            <a:endParaRPr lang="en-CA" dirty="0"/>
+              <a:t>Run docker-compose up to make migrations.</a:t>
+            </a:r>
           </a:p>
         </p:txBody>
       </p:sp>
@@ -4417,6 +4414,350 @@
           <p:cNvPr id="2" name="Title 1">
             <a:extLst>
               <a:ext uri="{FF2B5EF4-FFF2-40B4-BE49-F238E27FC236}">
+                <a16:creationId xmlns:a16="http://schemas.microsoft.com/office/drawing/2014/main" id="{C35866FF-7E7D-4496-8B0B-02CFA85CD3B7}"/>
+              </a:ext>
+            </a:extLst>
+          </p:cNvPr>
+          <p:cNvSpPr>
+            <a:spLocks noGrp="1"/>
+          </p:cNvSpPr>
+          <p:nvPr>
+            <p:ph type="title"/>
+          </p:nvPr>
+        </p:nvSpPr>
+        <p:spPr/>
+        <p:txBody>
+          <a:bodyPr/>
+          <a:lstStyle/>
+          <a:p>
+            <a:r>
+              <a:rPr lang="en-CA" dirty="0"/>
+              <a:t>View on browser</a:t>
+            </a:r>
+          </a:p>
+        </p:txBody>
+      </p:sp>
+      <p:sp>
+        <p:nvSpPr>
+          <p:cNvPr id="3" name="Content Placeholder 2">
+            <a:extLst>
+              <a:ext uri="{FF2B5EF4-FFF2-40B4-BE49-F238E27FC236}">
+                <a16:creationId xmlns:a16="http://schemas.microsoft.com/office/drawing/2014/main" id="{E19CE7F7-F5DB-48D1-8AA1-842A521ED074}"/>
+              </a:ext>
+            </a:extLst>
+          </p:cNvPr>
+          <p:cNvSpPr>
+            <a:spLocks noGrp="1"/>
+          </p:cNvSpPr>
+          <p:nvPr>
+            <p:ph idx="1"/>
+          </p:nvPr>
+        </p:nvSpPr>
+        <p:spPr/>
+        <p:txBody>
+          <a:bodyPr/>
+          <a:lstStyle/>
+          <a:p>
+            <a:r>
+              <a:rPr lang="en-CA" dirty="0"/>
+              <a:t>Open </a:t>
+            </a:r>
+            <a:r>
+              <a:rPr lang="en-CA" dirty="0" err="1"/>
+              <a:t>cmd</a:t>
+            </a:r>
+            <a:r>
+              <a:rPr lang="en-CA" dirty="0"/>
+              <a:t> and call this command to create superuser in order to access admin panel:</a:t>
+            </a:r>
+          </a:p>
+          <a:p>
+            <a:pPr lvl="1"/>
+            <a:r>
+              <a:rPr lang="en-US" sz="1800" dirty="0">
+                <a:solidFill>
+                  <a:prstClr val="black"/>
+                </a:solidFill>
+                <a:latin typeface="Lucida Console" panose="020B0609040504020204" pitchFamily="49" charset="0"/>
+              </a:rPr>
+              <a:t>docker-compose run app </a:t>
+            </a:r>
+            <a:r>
+              <a:rPr lang="en-US" sz="1800" dirty="0" err="1">
+                <a:solidFill>
+                  <a:prstClr val="black"/>
+                </a:solidFill>
+                <a:latin typeface="Lucida Console" panose="020B0609040504020204" pitchFamily="49" charset="0"/>
+              </a:rPr>
+              <a:t>sh</a:t>
+            </a:r>
+            <a:r>
+              <a:rPr lang="en-US" sz="1800" dirty="0">
+                <a:solidFill>
+                  <a:prstClr val="black"/>
+                </a:solidFill>
+                <a:latin typeface="Lucida Console" panose="020B0609040504020204" pitchFamily="49" charset="0"/>
+              </a:rPr>
+              <a:t> -c "python manage.py </a:t>
+            </a:r>
+            <a:r>
+              <a:rPr lang="en-US" sz="1800" dirty="0" err="1">
+                <a:solidFill>
+                  <a:prstClr val="black"/>
+                </a:solidFill>
+                <a:latin typeface="Lucida Console" panose="020B0609040504020204" pitchFamily="49" charset="0"/>
+              </a:rPr>
+              <a:t>createsuperuser</a:t>
+            </a:r>
+            <a:r>
+              <a:rPr lang="en-US" sz="1800" dirty="0">
+                <a:solidFill>
+                  <a:prstClr val="black"/>
+                </a:solidFill>
+                <a:latin typeface="Lucida Console" panose="020B0609040504020204" pitchFamily="49" charset="0"/>
+              </a:rPr>
+              <a:t>“</a:t>
+            </a:r>
+            <a:endParaRPr lang="en-CA" sz="1800" dirty="0">
+              <a:solidFill>
+                <a:prstClr val="black"/>
+              </a:solidFill>
+              <a:latin typeface="Lucida Console" panose="020B0609040504020204" pitchFamily="49" charset="0"/>
+            </a:endParaRPr>
+          </a:p>
+          <a:p>
+            <a:pPr lvl="1"/>
+            <a:endParaRPr lang="en-CA" dirty="0"/>
+          </a:p>
+        </p:txBody>
+      </p:sp>
+    </p:spTree>
+    <p:extLst>
+      <p:ext uri="{BB962C8B-B14F-4D97-AF65-F5344CB8AC3E}">
+        <p14:creationId xmlns:p14="http://schemas.microsoft.com/office/powerpoint/2010/main" val="2843721132"/>
+      </p:ext>
+    </p:extLst>
+  </p:cSld>
+  <p:clrMapOvr>
+    <a:masterClrMapping/>
+  </p:clrMapOvr>
+</p:sld>
+</file>
+
+<file path=ppt/slides/slide17.xml><?xml version="1.0" encoding="utf-8"?>
+<p:sld xmlns:a="http://schemas.openxmlformats.org/drawingml/2006/main" xmlns:r="http://schemas.openxmlformats.org/officeDocument/2006/relationships" xmlns:p="http://schemas.openxmlformats.org/presentationml/2006/main">
+  <p:cSld>
+    <p:spTree>
+      <p:nvGrpSpPr>
+        <p:cNvPr id="1" name=""/>
+        <p:cNvGrpSpPr/>
+        <p:nvPr/>
+      </p:nvGrpSpPr>
+      <p:grpSpPr>
+        <a:xfrm>
+          <a:off x="0" y="0"/>
+          <a:ext cx="0" cy="0"/>
+          <a:chOff x="0" y="0"/>
+          <a:chExt cx="0" cy="0"/>
+        </a:xfrm>
+      </p:grpSpPr>
+      <p:sp>
+        <p:nvSpPr>
+          <p:cNvPr id="2" name="Title 1">
+            <a:extLst>
+              <a:ext uri="{FF2B5EF4-FFF2-40B4-BE49-F238E27FC236}">
+                <a16:creationId xmlns:a16="http://schemas.microsoft.com/office/drawing/2014/main" id="{18DB9FFD-F528-4819-8EE4-B5A0797BF693}"/>
+              </a:ext>
+            </a:extLst>
+          </p:cNvPr>
+          <p:cNvSpPr>
+            <a:spLocks noGrp="1"/>
+          </p:cNvSpPr>
+          <p:nvPr>
+            <p:ph type="title"/>
+          </p:nvPr>
+        </p:nvSpPr>
+        <p:spPr/>
+        <p:txBody>
+          <a:bodyPr/>
+          <a:lstStyle/>
+          <a:p>
+            <a:r>
+              <a:rPr lang="en-CA" dirty="0"/>
+              <a:t>Now lets manage users (CRUD on users)</a:t>
+            </a:r>
+          </a:p>
+        </p:txBody>
+      </p:sp>
+      <p:sp>
+        <p:nvSpPr>
+          <p:cNvPr id="3" name="Content Placeholder 2">
+            <a:extLst>
+              <a:ext uri="{FF2B5EF4-FFF2-40B4-BE49-F238E27FC236}">
+                <a16:creationId xmlns:a16="http://schemas.microsoft.com/office/drawing/2014/main" id="{DE14E6A6-3ACF-4A1E-B488-A4CE3C749028}"/>
+              </a:ext>
+            </a:extLst>
+          </p:cNvPr>
+          <p:cNvSpPr>
+            <a:spLocks noGrp="1"/>
+          </p:cNvSpPr>
+          <p:nvPr>
+            <p:ph idx="1"/>
+          </p:nvPr>
+        </p:nvSpPr>
+        <p:spPr/>
+        <p:txBody>
+          <a:bodyPr/>
+          <a:lstStyle/>
+          <a:p>
+            <a:r>
+              <a:rPr lang="en-CA" dirty="0"/>
+              <a:t>To manage users, we’ll create new app first. (like core)</a:t>
+            </a:r>
+          </a:p>
+          <a:p>
+            <a:pPr lvl="1"/>
+            <a:r>
+              <a:rPr lang="en-CA" dirty="0"/>
+              <a:t> </a:t>
+            </a:r>
+            <a:r>
+              <a:rPr lang="en-US" sz="1800" dirty="0">
+                <a:solidFill>
+                  <a:prstClr val="black"/>
+                </a:solidFill>
+                <a:latin typeface="Lucida Console" panose="020B0609040504020204" pitchFamily="49" charset="0"/>
+              </a:rPr>
+              <a:t>docker-compose run app </a:t>
+            </a:r>
+            <a:r>
+              <a:rPr lang="en-US" sz="1800" dirty="0" err="1">
+                <a:solidFill>
+                  <a:prstClr val="black"/>
+                </a:solidFill>
+                <a:latin typeface="Lucida Console" panose="020B0609040504020204" pitchFamily="49" charset="0"/>
+              </a:rPr>
+              <a:t>sh</a:t>
+            </a:r>
+            <a:r>
+              <a:rPr lang="en-US" sz="1800" dirty="0">
+                <a:solidFill>
+                  <a:prstClr val="black"/>
+                </a:solidFill>
+                <a:latin typeface="Lucida Console" panose="020B0609040504020204" pitchFamily="49" charset="0"/>
+              </a:rPr>
+              <a:t> -c "python manage.py </a:t>
+            </a:r>
+            <a:r>
+              <a:rPr lang="en-US" sz="1800" dirty="0" err="1">
+                <a:solidFill>
+                  <a:prstClr val="black"/>
+                </a:solidFill>
+                <a:latin typeface="Lucida Console" panose="020B0609040504020204" pitchFamily="49" charset="0"/>
+              </a:rPr>
+              <a:t>startapp</a:t>
+            </a:r>
+            <a:r>
+              <a:rPr lang="en-US" sz="1800" dirty="0">
+                <a:solidFill>
+                  <a:prstClr val="black"/>
+                </a:solidFill>
+                <a:latin typeface="Lucida Console" panose="020B0609040504020204" pitchFamily="49" charset="0"/>
+              </a:rPr>
+              <a:t> user"</a:t>
+            </a:r>
+          </a:p>
+          <a:p>
+            <a:pPr lvl="1"/>
+            <a:r>
+              <a:rPr lang="en-CA" dirty="0"/>
+              <a:t>Remove test, admin, model files and create test &gt; __init__.py</a:t>
+            </a:r>
+          </a:p>
+          <a:p>
+            <a:pPr lvl="1"/>
+            <a:r>
+              <a:rPr lang="en-CA" dirty="0"/>
+              <a:t>Add </a:t>
+            </a:r>
+            <a:r>
+              <a:rPr lang="en-CA" dirty="0" err="1"/>
+              <a:t>rest_framework</a:t>
+            </a:r>
+            <a:r>
+              <a:rPr lang="en-CA" dirty="0"/>
+              <a:t>, </a:t>
+            </a:r>
+            <a:r>
+              <a:rPr lang="en-CA" dirty="0" err="1"/>
+              <a:t>authtoken</a:t>
+            </a:r>
+            <a:r>
+              <a:rPr lang="en-CA" dirty="0"/>
+              <a:t> and user apps in installed app (settings)</a:t>
+            </a:r>
+          </a:p>
+          <a:p>
+            <a:pPr lvl="1"/>
+            <a:r>
+              <a:rPr lang="en-CA" dirty="0"/>
+              <a:t>Create the test class and add tests for create user </a:t>
+            </a:r>
+            <a:r>
+              <a:rPr lang="en-CA" dirty="0" err="1"/>
+              <a:t>api</a:t>
+            </a:r>
+            <a:endParaRPr lang="en-CA"/>
+          </a:p>
+          <a:p>
+            <a:pPr lvl="1"/>
+            <a:endParaRPr lang="en-CA" dirty="0"/>
+          </a:p>
+          <a:p>
+            <a:pPr lvl="1"/>
+            <a:endParaRPr lang="en-CA" dirty="0"/>
+          </a:p>
+          <a:p>
+            <a:pPr lvl="1"/>
+            <a:endParaRPr lang="en-CA" dirty="0"/>
+          </a:p>
+        </p:txBody>
+      </p:sp>
+    </p:spTree>
+    <p:extLst>
+      <p:ext uri="{BB962C8B-B14F-4D97-AF65-F5344CB8AC3E}">
+        <p14:creationId xmlns:p14="http://schemas.microsoft.com/office/powerpoint/2010/main" val="3760171698"/>
+      </p:ext>
+    </p:extLst>
+  </p:cSld>
+  <p:clrMapOvr>
+    <a:masterClrMapping/>
+  </p:clrMapOvr>
+</p:sld>
+</file>
+
+<file path=ppt/slides/slide18.xml><?xml version="1.0" encoding="utf-8"?>
+<p:sld xmlns:a="http://schemas.openxmlformats.org/drawingml/2006/main" xmlns:r="http://schemas.openxmlformats.org/officeDocument/2006/relationships" xmlns:p="http://schemas.openxmlformats.org/presentationml/2006/main">
+  <p:cSld>
+    <p:spTree>
+      <p:nvGrpSpPr>
+        <p:cNvPr id="1" name=""/>
+        <p:cNvGrpSpPr/>
+        <p:nvPr/>
+      </p:nvGrpSpPr>
+      <p:grpSpPr>
+        <a:xfrm>
+          <a:off x="0" y="0"/>
+          <a:ext cx="0" cy="0"/>
+          <a:chOff x="0" y="0"/>
+          <a:chExt cx="0" cy="0"/>
+        </a:xfrm>
+      </p:grpSpPr>
+      <p:sp>
+        <p:nvSpPr>
+          <p:cNvPr id="2" name="Title 1">
+            <a:extLst>
+              <a:ext uri="{FF2B5EF4-FFF2-40B4-BE49-F238E27FC236}">
                 <a16:creationId xmlns:a16="http://schemas.microsoft.com/office/drawing/2014/main" id="{ABCC5C36-83CB-4981-9379-43EC8DC835DF}"/>
               </a:ext>
             </a:extLst>
@@ -4471,6 +4812,12 @@
             <a:r>
               <a:rPr lang="en-US" dirty="0"/>
               <a:t>Always write test first before developing models.</a:t>
+            </a:r>
+          </a:p>
+          <a:p>
+            <a:r>
+              <a:rPr lang="en-US" dirty="0"/>
+              <a:t>Each test function will have refresh the database</a:t>
             </a:r>
           </a:p>
           <a:p>

</xml_diff>